<commit_message>
Update Crypto Market Presentation.pptx
</commit_message>
<xml_diff>
--- a/Crypto Market Presentation.pptx
+++ b/Crypto Market Presentation.pptx
@@ -6611,7 +6611,7 @@
           <p:nvPr>
             <p:extLst>
               <p:ext uri="{D42A27DB-BD31-4B8C-83A1-F6EECF244321}">
-                <p14:modId xmlns:p14="http://schemas.microsoft.com/office/powerpoint/2010/main" val="36882262"/>
+                <p14:modId xmlns:p14="http://schemas.microsoft.com/office/powerpoint/2010/main" val="505862580"/>
               </p:ext>
             </p:extLst>
           </p:nvPr>
@@ -6683,7 +6683,7 @@
                       </a:pPr>
                       <a:r>
                         <a:rPr lang="it" sz="1100" dirty="0"/>
-                        <a:t>0.08</a:t>
+                        <a:t>0.084</a:t>
                       </a:r>
                       <a:endParaRPr sz="1100" dirty="0"/>
                     </a:p>
@@ -6736,7 +6736,7 @@
                       </a:pPr>
                       <a:r>
                         <a:rPr lang="it" sz="1100" dirty="0"/>
-                        <a:t>9</a:t>
+                        <a:t>8</a:t>
                       </a:r>
                       <a:endParaRPr sz="1100" dirty="0"/>
                     </a:p>
@@ -6842,7 +6842,7 @@
                       </a:pPr>
                       <a:r>
                         <a:rPr lang="it" sz="1100" dirty="0"/>
-                        <a:t>1 (Symbol)</a:t>
+                        <a:t>1</a:t>
                       </a:r>
                       <a:endParaRPr sz="1100" dirty="0"/>
                     </a:p>
@@ -6895,7 +6895,7 @@
                       </a:pPr>
                       <a:r>
                         <a:rPr lang="it" sz="1100" dirty="0"/>
-                        <a:t>7</a:t>
+                        <a:t>6</a:t>
                       </a:r>
                       <a:endParaRPr sz="1100" dirty="0"/>
                     </a:p>
@@ -7071,6 +7071,36 @@
           </a:graphicData>
         </a:graphic>
       </p:graphicFrame>
+      <p:pic>
+        <p:nvPicPr>
+          <p:cNvPr id="3" name="Immagine 2" descr="Immagine che contiene testo, Carattere, numero, linea">
+            <a:extLst>
+              <a:ext uri="{FF2B5EF4-FFF2-40B4-BE49-F238E27FC236}">
+                <a16:creationId xmlns:a16="http://schemas.microsoft.com/office/drawing/2014/main" id="{07B690E5-53DA-E53E-04D8-D34665713014}"/>
+              </a:ext>
+            </a:extLst>
+          </p:cNvPr>
+          <p:cNvPicPr>
+            <a:picLocks noChangeAspect="1"/>
+          </p:cNvPicPr>
+          <p:nvPr/>
+        </p:nvPicPr>
+        <p:blipFill>
+          <a:blip r:embed="rId3"/>
+          <a:stretch>
+            <a:fillRect/>
+          </a:stretch>
+        </p:blipFill>
+        <p:spPr>
+          <a:xfrm>
+            <a:off x="311700" y="3401825"/>
+            <a:ext cx="4714179" cy="1057490"/>
+          </a:xfrm>
+          <a:prstGeom prst="rect">
+            <a:avLst/>
+          </a:prstGeom>
+        </p:spPr>
+      </p:pic>
     </p:spTree>
   </p:cSld>
   <p:clrMapOvr>
@@ -7132,19 +7162,7 @@
             </a:pPr>
             <a:r>
               <a:rPr lang="it" dirty="0"/>
-              <a:t>Size Breakdown (</a:t>
-            </a:r>
-            <a:r>
-              <a:rPr lang="it" dirty="0">
-                <a:solidFill>
-                  <a:srgbClr val="FF0000"/>
-                </a:solidFill>
-              </a:rPr>
-              <a:t>Optional Slide</a:t>
-            </a:r>
-            <a:r>
-              <a:rPr lang="it" dirty="0"/>
-              <a:t>) - How the libraries scale?</a:t>
+              <a:t>Size Breakdown - How the libraries scale?</a:t>
             </a:r>
             <a:endParaRPr dirty="0"/>
           </a:p>
@@ -7157,14 +7175,14 @@
           <p:nvPr>
             <p:extLst>
               <p:ext uri="{D42A27DB-BD31-4B8C-83A1-F6EECF244321}">
-                <p14:modId xmlns:p14="http://schemas.microsoft.com/office/powerpoint/2010/main" val="2513856000"/>
+                <p14:modId xmlns:p14="http://schemas.microsoft.com/office/powerpoint/2010/main" val="2851326903"/>
               </p:ext>
             </p:extLst>
           </p:nvPr>
         </p:nvGraphicFramePr>
         <p:xfrm>
           <a:off x="952500" y="1559125"/>
-          <a:ext cx="7239000" cy="2407770"/>
+          <a:ext cx="7239000" cy="2224920"/>
         </p:xfrm>
         <a:graphic>
           <a:graphicData uri="http://schemas.openxmlformats.org/drawingml/2006/table">
@@ -7205,10 +7223,10 @@
                         <a:buNone/>
                       </a:pPr>
                       <a:r>
-                        <a:rPr lang="it"/>
-                        <a:t>Pandas</a:t>
+                        <a:rPr lang="it" dirty="0"/>
+                        <a:t>Pandas, Datatable, Vaex</a:t>
                       </a:r>
-                      <a:endParaRPr/>
+                      <a:endParaRPr dirty="0"/>
                     </a:p>
                   </a:txBody>
                   <a:tcPr marL="91425" marR="91425" marT="91425" marB="91425"/>
@@ -7228,10 +7246,10 @@
                         <a:buNone/>
                       </a:pPr>
                       <a:r>
-                        <a:rPr lang="it"/>
-                        <a:t>e.g., Works ok</a:t>
+                        <a:rPr lang="it" dirty="0"/>
+                        <a:t>Optimized to work on big dataset</a:t>
                       </a:r>
-                      <a:endParaRPr/>
+                      <a:endParaRPr dirty="0"/>
                     </a:p>
                   </a:txBody>
                   <a:tcPr marL="91425" marR="91425" marT="91425" marB="91425"/>
@@ -7258,10 +7276,10 @@
                         <a:buNone/>
                       </a:pPr>
                       <a:r>
-                        <a:rPr lang="it"/>
+                        <a:rPr lang="it" dirty="0"/>
                         <a:t>Polars</a:t>
                       </a:r>
-                      <a:endParaRPr/>
+                      <a:endParaRPr dirty="0"/>
                     </a:p>
                   </a:txBody>
                   <a:tcPr marL="91425" marR="91425" marT="91425" marB="91425"/>
@@ -7281,10 +7299,26 @@
                         <a:buNone/>
                       </a:pPr>
                       <a:r>
-                        <a:rPr lang="it"/>
-                        <a:t>e.g., Have problem it works with at least 10M rows</a:t>
+                        <a:rPr lang="it-IT" dirty="0"/>
+                        <a:t>Works good in step mode (</a:t>
                       </a:r>
-                      <a:endParaRPr/>
+                      <a:r>
+                        <a:rPr lang="it-IT" dirty="0" err="1"/>
+                        <a:t>probably</a:t>
+                      </a:r>
+                      <a:r>
+                        <a:rPr lang="it-IT" dirty="0"/>
+                        <a:t> for </a:t>
+                      </a:r>
+                      <a:r>
+                        <a:rPr lang="it-IT" dirty="0" err="1"/>
+                        <a:t>Lazy</a:t>
+                      </a:r>
+                      <a:r>
+                        <a:rPr lang="it-IT" dirty="0"/>
+                        <a:t> Evaluation)</a:t>
+                      </a:r>
+                      <a:endParaRPr dirty="0"/>
                     </a:p>
                   </a:txBody>
                   <a:tcPr marL="91425" marR="91425" marT="91425" marB="91425"/>
@@ -7343,7 +7377,7 @@
                       </a:pPr>
                       <a:r>
                         <a:rPr lang="it" dirty="0"/>
-                        <a:t>Problem with the size of the dataset (Connection Error)</a:t>
+                        <a:t>Problem with the size of the dataset (Connection Refused) since it was build to work with distributed systems</a:t>
                       </a:r>
                       <a:endParaRPr dirty="0"/>
                     </a:p>
@@ -7372,63 +7406,10 @@
                         <a:buNone/>
                       </a:pPr>
                       <a:r>
-                        <a:rPr lang="it"/>
-                        <a:t>Spark</a:t>
+                        <a:rPr lang="it" dirty="0"/>
+                        <a:t>Spark, Modin_dask, Modin_ray</a:t>
                       </a:r>
-                      <a:endParaRPr/>
-                    </a:p>
-                  </a:txBody>
-                  <a:tcPr marL="91425" marR="91425" marT="91425" marB="91425"/>
-                </a:tc>
-                <a:tc>
-                  <a:txBody>
-                    <a:bodyPr/>
-                    <a:lstStyle/>
-                    <a:p>
-                      <a:pPr marL="0" lvl="0" indent="0" algn="l" rtl="0">
-                        <a:spcBef>
-                          <a:spcPts val="0"/>
-                        </a:spcBef>
-                        <a:spcAft>
-                          <a:spcPts val="0"/>
-                        </a:spcAft>
-                        <a:buNone/>
-                      </a:pPr>
-                      <a:r>
-                        <a:rPr lang="it"/>
-                        <a:t>…</a:t>
-                      </a:r>
-                      <a:endParaRPr/>
-                    </a:p>
-                  </a:txBody>
-                  <a:tcPr marL="91425" marR="91425" marT="91425" marB="91425"/>
-                </a:tc>
-                <a:extLst>
-                  <a:ext uri="{0D108BD9-81ED-4DB2-BD59-A6C34878D82A}">
-                    <a16:rowId xmlns:a16="http://schemas.microsoft.com/office/drawing/2014/main" val="10003"/>
-                  </a:ext>
-                </a:extLst>
-              </a:tr>
-              <a:tr h="381000">
-                <a:tc>
-                  <a:txBody>
-                    <a:bodyPr/>
-                    <a:lstStyle/>
-                    <a:p>
-                      <a:pPr marL="0" lvl="0" indent="0" algn="l" rtl="0">
-                        <a:spcBef>
-                          <a:spcPts val="0"/>
-                        </a:spcBef>
-                        <a:spcAft>
-                          <a:spcPts val="0"/>
-                        </a:spcAft>
-                        <a:buNone/>
-                      </a:pPr>
-                      <a:r>
-                        <a:rPr lang="it"/>
-                        <a:t>…</a:t>
-                      </a:r>
-                      <a:endParaRPr/>
+                      <a:endParaRPr dirty="0"/>
                     </a:p>
                   </a:txBody>
                   <a:tcPr marL="91425" marR="91425" marT="91425" marB="91425"/>
@@ -7449,7 +7430,7 @@
                       </a:pPr>
                       <a:r>
                         <a:rPr lang="it" dirty="0"/>
-                        <a:t>…</a:t>
+                        <a:t>Run but with worse performance</a:t>
                       </a:r>
                       <a:endParaRPr dirty="0"/>
                     </a:p>
@@ -7458,7 +7439,7 @@
                 </a:tc>
                 <a:extLst>
                   <a:ext uri="{0D108BD9-81ED-4DB2-BD59-A6C34878D82A}">
-                    <a16:rowId xmlns:a16="http://schemas.microsoft.com/office/drawing/2014/main" val="10004"/>
+                    <a16:rowId xmlns:a16="http://schemas.microsoft.com/office/drawing/2014/main" val="10003"/>
                   </a:ext>
                 </a:extLst>
               </a:tr>
@@ -7466,48 +7447,6 @@
           </a:graphicData>
         </a:graphic>
       </p:graphicFrame>
-      <p:sp>
-        <p:nvSpPr>
-          <p:cNvPr id="70" name="Google Shape;70;p15"/>
-          <p:cNvSpPr txBox="1">
-            <a:spLocks noGrp="1"/>
-          </p:cNvSpPr>
-          <p:nvPr>
-            <p:ph type="subTitle" idx="4294967295"/>
-          </p:nvPr>
-        </p:nvSpPr>
-        <p:spPr>
-          <a:xfrm>
-            <a:off x="311700" y="1017725"/>
-            <a:ext cx="8520600" cy="413100"/>
-          </a:xfrm>
-          <a:prstGeom prst="rect">
-            <a:avLst/>
-          </a:prstGeom>
-        </p:spPr>
-        <p:txBody>
-          <a:bodyPr spcFirstLastPara="1" wrap="square" lIns="91425" tIns="91425" rIns="91425" bIns="91425" anchor="t" anchorCtr="0">
-            <a:normAutofit fontScale="25000" lnSpcReduction="20000"/>
-          </a:bodyPr>
-          <a:lstStyle/>
-          <a:p>
-            <a:pPr marL="0" lvl="0" indent="0" algn="l" rtl="0">
-              <a:spcBef>
-                <a:spcPts val="0"/>
-              </a:spcBef>
-              <a:spcAft>
-                <a:spcPts val="1200"/>
-              </a:spcAft>
-              <a:buNone/>
-            </a:pPr>
-            <a:r>
-              <a:rPr lang="it" sz="2000"/>
-              <a:t>If you have had some problem with the size of the dataset write here and explain in your opinion why</a:t>
-            </a:r>
-            <a:endParaRPr sz="2000"/>
-          </a:p>
-        </p:txBody>
-      </p:sp>
     </p:spTree>
   </p:cSld>
   <p:clrMapOvr>
@@ -7724,25 +7663,6 @@
               <a:t>Groupby</a:t>
             </a:r>
             <a:endParaRPr lang="it-IT" dirty="0"/>
-          </a:p>
-          <a:p>
-            <a:pPr marL="285750" indent="-285750">
-              <a:spcAft>
-                <a:spcPts val="1200"/>
-              </a:spcAft>
-            </a:pPr>
-            <a:r>
-              <a:rPr lang="it-IT" dirty="0"/>
-              <a:t>Merge</a:t>
-            </a:r>
-          </a:p>
-          <a:p>
-            <a:pPr marL="285750" indent="-285750">
-              <a:spcAft>
-                <a:spcPts val="1200"/>
-              </a:spcAft>
-            </a:pPr>
-            <a:endParaRPr dirty="0"/>
           </a:p>
         </p:txBody>
       </p:sp>
@@ -8088,10 +8008,10 @@
               <a:buNone/>
             </a:pPr>
             <a:r>
-              <a:rPr lang="it"/>
+              <a:rPr lang="it" dirty="0"/>
               <a:t>Description of results comparison between Core/Step/Pipe</a:t>
             </a:r>
-            <a:endParaRPr/>
+            <a:endParaRPr dirty="0"/>
           </a:p>
         </p:txBody>
       </p:sp>
@@ -8241,9 +8161,29 @@
               </a:rPr>
               <a:t>Problems encountered on the project (if any)</a:t>
             </a:r>
-            <a:br>
-              <a:rPr lang="it" sz="1000" dirty="0"/>
-            </a:br>
+            <a:endParaRPr lang="it" sz="1000" dirty="0">
+              <a:solidFill>
+                <a:schemeClr val="dk1"/>
+              </a:solidFill>
+            </a:endParaRPr>
+          </a:p>
+          <a:p>
+            <a:pPr marL="101600" lvl="0" indent="0" algn="l" rtl="0">
+              <a:lnSpc>
+                <a:spcPct val="100000"/>
+              </a:lnSpc>
+              <a:spcBef>
+                <a:spcPts val="0"/>
+              </a:spcBef>
+              <a:spcAft>
+                <a:spcPts val="0"/>
+              </a:spcAft>
+              <a:buClr>
+                <a:schemeClr val="dk1"/>
+              </a:buClr>
+              <a:buSzPts val="2000"/>
+              <a:buNone/>
+            </a:pPr>
             <a:r>
               <a:rPr lang="it-IT" dirty="0"/>
               <a:t>The </a:t>
@@ -8362,7 +8302,7 @@
             </a:r>
             <a:r>
               <a:rPr lang="it-IT" dirty="0" err="1"/>
-              <a:t>error</a:t>
+              <a:t>refused</a:t>
             </a:r>
             <a:r>
               <a:rPr lang="it-IT" dirty="0"/>
@@ -8406,7 +8346,39 @@
             </a:r>
             <a:r>
               <a:rPr lang="it-IT" dirty="0"/>
+              <a:t>, to solve </a:t>
+            </a:r>
+            <a:r>
+              <a:rPr lang="it-IT" dirty="0" err="1"/>
+              <a:t>it</a:t>
+            </a:r>
+            <a:r>
+              <a:rPr lang="it-IT" dirty="0"/>
               <a:t> </a:t>
+            </a:r>
+            <a:r>
+              <a:rPr lang="it-IT" dirty="0" err="1"/>
+              <a:t>we</a:t>
+            </a:r>
+            <a:r>
+              <a:rPr lang="it-IT" dirty="0"/>
+              <a:t> </a:t>
+            </a:r>
+            <a:r>
+              <a:rPr lang="it-IT" dirty="0" err="1"/>
+              <a:t>loaded</a:t>
+            </a:r>
+            <a:r>
+              <a:rPr lang="it-IT" dirty="0"/>
+              <a:t> </a:t>
+            </a:r>
+            <a:r>
+              <a:rPr lang="it-IT" dirty="0" err="1"/>
+              <a:t>only</a:t>
+            </a:r>
+            <a:r>
+              <a:rPr lang="it-IT" dirty="0"/>
+              <a:t> a small part of the dataset</a:t>
             </a:r>
             <a:endParaRPr dirty="0"/>
           </a:p>
@@ -8434,7 +8406,7 @@
             </a:endParaRPr>
           </a:p>
           <a:p>
-            <a:pPr marL="457200" lvl="0" indent="-342900" algn="l" rtl="0">
+            <a:pPr marL="571500" lvl="0" indent="-457200" algn="l" rtl="0">
               <a:lnSpc>
                 <a:spcPct val="100000"/>
               </a:lnSpc>
@@ -8448,7 +8420,8 @@
                 <a:srgbClr val="202124"/>
               </a:buClr>
               <a:buSzPts val="1800"/>
-              <a:buAutoNum type="arabicPeriod"/>
+              <a:buFont typeface="+mj-lt"/>
+              <a:buAutoNum type="arabicPeriod" startAt="2"/>
             </a:pPr>
             <a:r>
               <a:rPr lang="it" sz="2000" dirty="0">
@@ -8458,11 +8431,37 @@
               </a:rPr>
               <a:t>Which libraries is the best? Why not other?</a:t>
             </a:r>
-            <a:endParaRPr dirty="0">
-              <a:solidFill>
+          </a:p>
+          <a:p>
+            <a:pPr marL="114300" indent="0">
+              <a:lnSpc>
+                <a:spcPct val="100000"/>
+              </a:lnSpc>
+              <a:buClr>
                 <a:srgbClr val="202124"/>
-              </a:solidFill>
-            </a:endParaRPr>
+              </a:buClr>
+              <a:buNone/>
+            </a:pPr>
+            <a:r>
+              <a:rPr lang="en-US" dirty="0"/>
+              <a:t>The best working libraries are pandas, </a:t>
+            </a:r>
+            <a:r>
+              <a:rPr lang="en-US" dirty="0" err="1"/>
+              <a:t>datatable</a:t>
+            </a:r>
+            <a:r>
+              <a:rPr lang="en-US" dirty="0"/>
+              <a:t> and </a:t>
+            </a:r>
+            <a:r>
+              <a:rPr lang="en-US" dirty="0" err="1"/>
+              <a:t>vaex</a:t>
+            </a:r>
+            <a:r>
+              <a:rPr lang="en-US" dirty="0"/>
+              <a:t> given that they are built to work on large datasets. Between our implementations, pandas was the easiest one. The other libraries perform worse as they focus on parallelizing operations rather than managing large datasets.</a:t>
+            </a:r>
           </a:p>
         </p:txBody>
       </p:sp>
@@ -9037,6 +9036,15 @@
 </file>
 
 <file path=customXml/item1.xml><?xml version="1.0" encoding="utf-8"?>
+<?mso-contentType ?>
+<FormTemplates xmlns="http://schemas.microsoft.com/sharepoint/v3/contenttype/forms">
+  <Display>DocumentLibraryForm</Display>
+  <Edit>DocumentLibraryForm</Edit>
+  <New>DocumentLibraryForm</New>
+</FormTemplates>
+</file>
+
+<file path=customXml/item2.xml><?xml version="1.0" encoding="utf-8"?>
 <ct:contentTypeSchema xmlns:ct="http://schemas.microsoft.com/office/2006/metadata/contentType" xmlns:ma="http://schemas.microsoft.com/office/2006/metadata/properties/metaAttributes" ct:_="" ma:_="" ma:contentTypeName="Document" ma:contentTypeID="0x01010044010DD6E8A765478ECC4B4EF4800ACC" ma:contentTypeVersion="13" ma:contentTypeDescription="Create a new document." ma:contentTypeScope="" ma:versionID="a4e063bae554e24e5443f55a738cb29a">
   <xsd:schema xmlns:xsd="http://www.w3.org/2001/XMLSchema" xmlns:xs="http://www.w3.org/2001/XMLSchema" xmlns:p="http://schemas.microsoft.com/office/2006/metadata/properties" xmlns:ns2="fd22e687-371b-414e-9e15-0f1095911aa6" xmlns:ns3="b0584e29-aeb5-4056-b862-c9e01aaf115a" targetNamespace="http://schemas.microsoft.com/office/2006/metadata/properties" ma:root="true" ma:fieldsID="a34d597af065eee0ceb38710a317da13" ns2:_="" ns3:_="">
     <xsd:import namespace="fd22e687-371b-414e-9e15-0f1095911aa6"/>
@@ -9259,16 +9267,15 @@
 </ct:contentTypeSchema>
 </file>
 
-<file path=customXml/item2.xml><?xml version="1.0" encoding="utf-8"?>
-<?mso-contentType ?>
-<FormTemplates xmlns="http://schemas.microsoft.com/sharepoint/v3/contenttype/forms">
-  <Display>DocumentLibraryForm</Display>
-  <Edit>DocumentLibraryForm</Edit>
-  <New>DocumentLibraryForm</New>
-</FormTemplates>
+<file path=customXml/itemProps1.xml><?xml version="1.0" encoding="utf-8"?>
+<ds:datastoreItem xmlns:ds="http://schemas.openxmlformats.org/officeDocument/2006/customXml" ds:itemID="{34CC30C9-2DDA-45A2-8096-27594D600213}">
+  <ds:schemaRefs>
+    <ds:schemaRef ds:uri="http://schemas.microsoft.com/sharepoint/v3/contenttype/forms"/>
+  </ds:schemaRefs>
+</ds:datastoreItem>
 </file>
 
-<file path=customXml/itemProps1.xml><?xml version="1.0" encoding="utf-8"?>
+<file path=customXml/itemProps2.xml><?xml version="1.0" encoding="utf-8"?>
 <ds:datastoreItem xmlns:ds="http://schemas.openxmlformats.org/officeDocument/2006/customXml" ds:itemID="{D91B5D6A-DB59-4B37-855C-02216C6CE879}">
   <ds:schemaRefs>
     <ds:schemaRef ds:uri="http://schemas.microsoft.com/office/2006/metadata/contentType"/>
@@ -9285,12 +9292,4 @@
     <ds:schemaRef ds:uri="http://schemas.microsoft.com/internal/obd"/>
   </ds:schemaRefs>
 </ds:datastoreItem>
-</file>
-
-<file path=customXml/itemProps2.xml><?xml version="1.0" encoding="utf-8"?>
-<ds:datastoreItem xmlns:ds="http://schemas.openxmlformats.org/officeDocument/2006/customXml" ds:itemID="{34CC30C9-2DDA-45A2-8096-27594D600213}">
-  <ds:schemaRefs>
-    <ds:schemaRef ds:uri="http://schemas.microsoft.com/sharepoint/v3/contenttype/forms"/>
-  </ds:schemaRefs>
-</ds:datastoreItem>
 </file>
</xml_diff>